<commit_message>
before friday meeting confirmation and TKDE
</commit_message>
<xml_diff>
--- a/extended version/Rectifying_flow_column.pptx
+++ b/extended version/Rectifying_flow_column.pptx
@@ -243,7 +243,7 @@
           <a:p>
             <a:fld id="{185F0BFD-5608-4F22-A047-776EBFDB86C9}" type="datetimeFigureOut">
               <a:rPr lang="en-AU" smtClean="0"/>
-              <a:t>19/09/2018</a:t>
+              <a:t>20/09/2018</a:t>
             </a:fld>
             <a:endParaRPr lang="en-AU"/>
           </a:p>
@@ -413,7 +413,7 @@
           <a:p>
             <a:fld id="{185F0BFD-5608-4F22-A047-776EBFDB86C9}" type="datetimeFigureOut">
               <a:rPr lang="en-AU" smtClean="0"/>
-              <a:t>19/09/2018</a:t>
+              <a:t>20/09/2018</a:t>
             </a:fld>
             <a:endParaRPr lang="en-AU"/>
           </a:p>
@@ -593,7 +593,7 @@
           <a:p>
             <a:fld id="{185F0BFD-5608-4F22-A047-776EBFDB86C9}" type="datetimeFigureOut">
               <a:rPr lang="en-AU" smtClean="0"/>
-              <a:t>19/09/2018</a:t>
+              <a:t>20/09/2018</a:t>
             </a:fld>
             <a:endParaRPr lang="en-AU"/>
           </a:p>
@@ -763,7 +763,7 @@
           <a:p>
             <a:fld id="{185F0BFD-5608-4F22-A047-776EBFDB86C9}" type="datetimeFigureOut">
               <a:rPr lang="en-AU" smtClean="0"/>
-              <a:t>19/09/2018</a:t>
+              <a:t>20/09/2018</a:t>
             </a:fld>
             <a:endParaRPr lang="en-AU"/>
           </a:p>
@@ -1009,7 +1009,7 @@
           <a:p>
             <a:fld id="{185F0BFD-5608-4F22-A047-776EBFDB86C9}" type="datetimeFigureOut">
               <a:rPr lang="en-AU" smtClean="0"/>
-              <a:t>19/09/2018</a:t>
+              <a:t>20/09/2018</a:t>
             </a:fld>
             <a:endParaRPr lang="en-AU"/>
           </a:p>
@@ -1241,7 +1241,7 @@
           <a:p>
             <a:fld id="{185F0BFD-5608-4F22-A047-776EBFDB86C9}" type="datetimeFigureOut">
               <a:rPr lang="en-AU" smtClean="0"/>
-              <a:t>19/09/2018</a:t>
+              <a:t>20/09/2018</a:t>
             </a:fld>
             <a:endParaRPr lang="en-AU"/>
           </a:p>
@@ -1608,7 +1608,7 @@
           <a:p>
             <a:fld id="{185F0BFD-5608-4F22-A047-776EBFDB86C9}" type="datetimeFigureOut">
               <a:rPr lang="en-AU" smtClean="0"/>
-              <a:t>19/09/2018</a:t>
+              <a:t>20/09/2018</a:t>
             </a:fld>
             <a:endParaRPr lang="en-AU"/>
           </a:p>
@@ -1726,7 +1726,7 @@
           <a:p>
             <a:fld id="{185F0BFD-5608-4F22-A047-776EBFDB86C9}" type="datetimeFigureOut">
               <a:rPr lang="en-AU" smtClean="0"/>
-              <a:t>19/09/2018</a:t>
+              <a:t>20/09/2018</a:t>
             </a:fld>
             <a:endParaRPr lang="en-AU"/>
           </a:p>
@@ -1821,7 +1821,7 @@
           <a:p>
             <a:fld id="{185F0BFD-5608-4F22-A047-776EBFDB86C9}" type="datetimeFigureOut">
               <a:rPr lang="en-AU" smtClean="0"/>
-              <a:t>19/09/2018</a:t>
+              <a:t>20/09/2018</a:t>
             </a:fld>
             <a:endParaRPr lang="en-AU"/>
           </a:p>
@@ -2098,7 +2098,7 @@
           <a:p>
             <a:fld id="{185F0BFD-5608-4F22-A047-776EBFDB86C9}" type="datetimeFigureOut">
               <a:rPr lang="en-AU" smtClean="0"/>
-              <a:t>19/09/2018</a:t>
+              <a:t>20/09/2018</a:t>
             </a:fld>
             <a:endParaRPr lang="en-AU"/>
           </a:p>
@@ -2351,7 +2351,7 @@
           <a:p>
             <a:fld id="{185F0BFD-5608-4F22-A047-776EBFDB86C9}" type="datetimeFigureOut">
               <a:rPr lang="en-AU" smtClean="0"/>
-              <a:t>19/09/2018</a:t>
+              <a:t>20/09/2018</a:t>
             </a:fld>
             <a:endParaRPr lang="en-AU"/>
           </a:p>
@@ -2564,7 +2564,7 @@
           <a:p>
             <a:fld id="{185F0BFD-5608-4F22-A047-776EBFDB86C9}" type="datetimeFigureOut">
               <a:rPr lang="en-AU" smtClean="0"/>
-              <a:t>19/09/2018</a:t>
+              <a:t>20/09/2018</a:t>
             </a:fld>
             <a:endParaRPr lang="en-AU"/>
           </a:p>
@@ -2978,7 +2978,7 @@
           <p:nvPr>
             <p:extLst>
               <p:ext uri="{D42A27DB-BD31-4B8C-83A1-F6EECF244321}">
-                <p14:modId xmlns:p14="http://schemas.microsoft.com/office/powerpoint/2010/main" val="1801432884"/>
+                <p14:modId xmlns:p14="http://schemas.microsoft.com/office/powerpoint/2010/main" val="2436781120"/>
               </p:ext>
             </p:extLst>
           </p:nvPr>
@@ -2991,7 +2991,7 @@
           <a:graphicData uri="http://schemas.openxmlformats.org/presentationml/2006/ole">
             <mc:AlternateContent xmlns:mc="http://schemas.openxmlformats.org/markup-compatibility/2006">
               <mc:Choice xmlns:v="urn:schemas-microsoft-com:vml" Requires="v">
-                <p:oleObj spid="_x0000_s1209" name="Worksheet" r:id="rId3" imgW="1438402" imgH="4010192" progId="Excel.Sheet.12">
+                <p:oleObj spid="_x0000_s1221" name="Worksheet" r:id="rId3" imgW="1438402" imgH="4010192" progId="Excel.Sheet.12">
                   <p:embed/>
                 </p:oleObj>
               </mc:Choice>
@@ -3655,7 +3655,7 @@
                             <a:rPr lang="en-AU" sz="1400" b="0" i="1" smtClean="0">
                               <a:latin typeface="Cambria Math" panose="02040503050406030204" pitchFamily="18" charset="0"/>
                             </a:rPr>
-                            <m:t>𝑉</m:t>
+                            <m:t>𝑋</m:t>
                           </m:r>
                         </m:e>
                         <m:sub>
@@ -3695,7 +3695,7 @@
               <a:blipFill>
                 <a:blip r:embed="rId8"/>
                 <a:stretch>
-                  <a:fillRect r="-95652"/>
+                  <a:fillRect r="-113043"/>
                 </a:stretch>
               </a:blipFill>
             </p:spPr>
@@ -4022,7 +4022,7 @@
           <p:nvPr>
             <p:extLst>
               <p:ext uri="{D42A27DB-BD31-4B8C-83A1-F6EECF244321}">
-                <p14:modId xmlns:p14="http://schemas.microsoft.com/office/powerpoint/2010/main" val="390734934"/>
+                <p14:modId xmlns:p14="http://schemas.microsoft.com/office/powerpoint/2010/main" val="3199962464"/>
               </p:ext>
             </p:extLst>
           </p:nvPr>
@@ -4035,7 +4035,7 @@
           <a:graphicData uri="http://schemas.openxmlformats.org/presentationml/2006/ole">
             <mc:AlternateContent xmlns:mc="http://schemas.openxmlformats.org/markup-compatibility/2006">
               <mc:Choice xmlns:v="urn:schemas-microsoft-com:vml" Requires="v">
-                <p:oleObj spid="_x0000_s1210" name="Worksheet" r:id="rId10" imgW="1438402" imgH="3819396" progId="Excel.Sheet.12">
+                <p:oleObj spid="_x0000_s1222" name="Worksheet" r:id="rId10" imgW="1438402" imgH="3819396" progId="Excel.Sheet.12">
                   <p:embed/>
                 </p:oleObj>
               </mc:Choice>
@@ -4079,7 +4079,7 @@
           <p:nvPr>
             <p:extLst>
               <p:ext uri="{D42A27DB-BD31-4B8C-83A1-F6EECF244321}">
-                <p14:modId xmlns:p14="http://schemas.microsoft.com/office/powerpoint/2010/main" val="3114592270"/>
+                <p14:modId xmlns:p14="http://schemas.microsoft.com/office/powerpoint/2010/main" val="1823968827"/>
               </p:ext>
             </p:extLst>
           </p:nvPr>
@@ -4092,7 +4092,7 @@
           <a:graphicData uri="http://schemas.openxmlformats.org/presentationml/2006/ole">
             <mc:AlternateContent xmlns:mc="http://schemas.openxmlformats.org/markup-compatibility/2006">
               <mc:Choice xmlns:v="urn:schemas-microsoft-com:vml" Requires="v">
-                <p:oleObj spid="_x0000_s1211" name="Worksheet" r:id="rId12" imgW="1438402" imgH="3628948" progId="Excel.Sheet.12">
+                <p:oleObj spid="_x0000_s1223" name="Worksheet" r:id="rId12" imgW="1438402" imgH="3628948" progId="Excel.Sheet.12">
                   <p:embed/>
                 </p:oleObj>
               </mc:Choice>
@@ -4136,7 +4136,7 @@
           <p:nvPr>
             <p:extLst>
               <p:ext uri="{D42A27DB-BD31-4B8C-83A1-F6EECF244321}">
-                <p14:modId xmlns:p14="http://schemas.microsoft.com/office/powerpoint/2010/main" val="4063260742"/>
+                <p14:modId xmlns:p14="http://schemas.microsoft.com/office/powerpoint/2010/main" val="1246006411"/>
               </p:ext>
             </p:extLst>
           </p:nvPr>
@@ -4149,7 +4149,7 @@
           <a:graphicData uri="http://schemas.openxmlformats.org/presentationml/2006/ole">
             <mc:AlternateContent xmlns:mc="http://schemas.openxmlformats.org/markup-compatibility/2006">
               <mc:Choice xmlns:v="urn:schemas-microsoft-com:vml" Requires="v">
-                <p:oleObj spid="_x0000_s1212" name="Worksheet" r:id="rId14" imgW="1438402" imgH="3438499" progId="Excel.Sheet.12">
+                <p:oleObj spid="_x0000_s1224" name="Worksheet" r:id="rId14" imgW="1438402" imgH="3438499" progId="Excel.Sheet.12">
                   <p:embed/>
                 </p:oleObj>
               </mc:Choice>
@@ -4785,7 +4785,7 @@
                             <a:rPr lang="en-AU" sz="1400" b="0" i="1" smtClean="0">
                               <a:latin typeface="Cambria Math" panose="02040503050406030204" pitchFamily="18" charset="0"/>
                             </a:rPr>
-                            <m:t>𝑉</m:t>
+                            <m:t>𝑋</m:t>
                           </m:r>
                         </m:e>
                         <m:sub>
@@ -4825,7 +4825,7 @@
               <a:blipFill>
                 <a:blip r:embed="rId16"/>
                 <a:stretch>
-                  <a:fillRect r="-95652"/>
+                  <a:fillRect r="-113043"/>
                 </a:stretch>
               </a:blipFill>
             </p:spPr>
@@ -5145,7 +5145,7 @@
                             <a:rPr lang="en-AU" sz="1400" b="0" i="1" smtClean="0">
                               <a:latin typeface="Cambria Math" panose="02040503050406030204" pitchFamily="18" charset="0"/>
                             </a:rPr>
-                            <m:t>𝑉</m:t>
+                            <m:t>𝑋</m:t>
                           </m:r>
                         </m:e>
                         <m:sub>
@@ -5185,7 +5185,7 @@
               <a:blipFill>
                 <a:blip r:embed="rId17"/>
                 <a:stretch>
-                  <a:fillRect r="-91667"/>
+                  <a:fillRect r="-108333"/>
                 </a:stretch>
               </a:blipFill>
             </p:spPr>
@@ -5317,7 +5317,7 @@
             <p:spPr>
               <a:xfrm>
                 <a:off x="3683952" y="5977299"/>
-                <a:ext cx="140951" cy="307777"/>
+                <a:ext cx="284384" cy="307777"/>
               </a:xfrm>
               <a:prstGeom prst="rect">
                 <a:avLst/>
@@ -5349,7 +5349,7 @@
                             <a:rPr lang="en-AU" sz="1400" b="0" i="1" smtClean="0">
                               <a:latin typeface="Cambria Math" panose="02040503050406030204" pitchFamily="18" charset="0"/>
                             </a:rPr>
-                            <m:t>𝑉</m:t>
+                            <m:t>𝑋</m:t>
                           </m:r>
                         </m:e>
                         <m:sub>
@@ -5381,7 +5381,7 @@
             <p:spPr>
               <a:xfrm>
                 <a:off x="3683952" y="5977299"/>
-                <a:ext cx="140951" cy="307777"/>
+                <a:ext cx="284384" cy="307777"/>
               </a:xfrm>
               <a:prstGeom prst="rect">
                 <a:avLst/>
@@ -5389,7 +5389,7 @@
               <a:blipFill>
                 <a:blip r:embed="rId18"/>
                 <a:stretch>
-                  <a:fillRect r="-143478"/>
+                  <a:fillRect r="-36170"/>
                 </a:stretch>
               </a:blipFill>
             </p:spPr>
@@ -5607,7 +5607,7 @@
                             <a:rPr lang="en-AU" sz="1400" b="0" i="1" smtClean="0">
                               <a:latin typeface="Cambria Math" panose="02040503050406030204" pitchFamily="18" charset="0"/>
                             </a:rPr>
-                            <m:t>𝑉</m:t>
+                            <m:t>𝑋</m:t>
                           </m:r>
                         </m:e>
                         <m:sub>
@@ -5647,7 +5647,7 @@
               <a:blipFill>
                 <a:blip r:embed="rId8"/>
                 <a:stretch>
-                  <a:fillRect r="-87500"/>
+                  <a:fillRect r="-104167"/>
                 </a:stretch>
               </a:blipFill>
             </p:spPr>
@@ -5811,7 +5811,7 @@
                             <a:rPr lang="en-AU" sz="1400" b="0" i="1" smtClean="0">
                               <a:latin typeface="Cambria Math" panose="02040503050406030204" pitchFamily="18" charset="0"/>
                             </a:rPr>
-                            <m:t>𝑉</m:t>
+                            <m:t>𝑋</m:t>
                           </m:r>
                         </m:e>
                         <m:sub>
@@ -5849,9 +5849,9 @@
                 <a:avLst/>
               </a:prstGeom>
               <a:blipFill>
-                <a:blip r:embed="rId18"/>
+                <a:blip r:embed="rId19"/>
                 <a:stretch>
-                  <a:fillRect r="-143478"/>
+                  <a:fillRect r="-160870"/>
                 </a:stretch>
               </a:blipFill>
             </p:spPr>
@@ -6069,7 +6069,7 @@
                             <a:rPr lang="en-AU" sz="1400" b="0" i="1" smtClean="0">
                               <a:latin typeface="Cambria Math" panose="02040503050406030204" pitchFamily="18" charset="0"/>
                             </a:rPr>
-                            <m:t>𝑉</m:t>
+                            <m:t>𝑋</m:t>
                           </m:r>
                         </m:e>
                         <m:sub>
@@ -6107,9 +6107,9 @@
                 <a:avLst/>
               </a:prstGeom>
               <a:blipFill>
-                <a:blip r:embed="rId19"/>
+                <a:blip r:embed="rId20"/>
                 <a:stretch>
-                  <a:fillRect r="-95652"/>
+                  <a:fillRect r="-113043"/>
                 </a:stretch>
               </a:blipFill>
             </p:spPr>
@@ -6168,10 +6168,10 @@
                         </m:sSubPr>
                         <m:e>
                           <m:r>
-                            <a:rPr lang="en-AU" sz="1400" i="1">
-                              <a:latin typeface="Cambria Math" panose="02040503050406030204" pitchFamily="18" charset="0"/>
-                            </a:rPr>
-                            <m:t>𝑆</m:t>
+                            <a:rPr lang="en-AU" sz="1400" b="0" i="1" smtClean="0">
+                              <a:latin typeface="Cambria Math" panose="02040503050406030204" pitchFamily="18" charset="0"/>
+                            </a:rPr>
+                            <m:t>𝑋</m:t>
                           </m:r>
                         </m:e>
                         <m:sub>
@@ -6209,9 +6209,9 @@
                 <a:avLst/>
               </a:prstGeom>
               <a:blipFill>
-                <a:blip r:embed="rId20"/>
+                <a:blip r:embed="rId21"/>
                 <a:stretch>
-                  <a:fillRect r="-91304"/>
+                  <a:fillRect r="-108696"/>
                 </a:stretch>
               </a:blipFill>
             </p:spPr>
@@ -6273,7 +6273,7 @@
                             <a:rPr lang="en-AU" sz="1400" b="0" i="1" smtClean="0">
                               <a:latin typeface="Cambria Math" panose="02040503050406030204" pitchFamily="18" charset="0"/>
                             </a:rPr>
-                            <m:t>𝑉</m:t>
+                            <m:t>𝑋</m:t>
                           </m:r>
                         </m:e>
                         <m:sub>
@@ -6311,9 +6311,9 @@
                 <a:avLst/>
               </a:prstGeom>
               <a:blipFill>
-                <a:blip r:embed="rId18"/>
+                <a:blip r:embed="rId19"/>
                 <a:stretch>
-                  <a:fillRect r="-143478"/>
+                  <a:fillRect r="-160870"/>
                 </a:stretch>
               </a:blipFill>
             </p:spPr>
@@ -6375,7 +6375,7 @@
                             <a:rPr lang="en-AU" sz="1400" b="0" i="1" smtClean="0">
                               <a:latin typeface="Cambria Math" panose="02040503050406030204" pitchFamily="18" charset="0"/>
                             </a:rPr>
-                            <m:t>𝑉</m:t>
+                            <m:t>𝑋</m:t>
                           </m:r>
                         </m:e>
                         <m:sub>
@@ -6413,9 +6413,9 @@
                 <a:avLst/>
               </a:prstGeom>
               <a:blipFill>
-                <a:blip r:embed="rId21"/>
+                <a:blip r:embed="rId22"/>
                 <a:stretch>
-                  <a:fillRect r="-86957"/>
+                  <a:fillRect r="-108696"/>
                 </a:stretch>
               </a:blipFill>
             </p:spPr>
@@ -6569,7 +6569,7 @@
                 <a:avLst/>
               </a:prstGeom>
               <a:blipFill>
-                <a:blip r:embed="rId22"/>
+                <a:blip r:embed="rId23"/>
                 <a:stretch>
                   <a:fillRect r="-86957"/>
                 </a:stretch>
@@ -6633,7 +6633,7 @@
                             <a:rPr lang="en-AU" sz="1400" b="0" i="1" smtClean="0">
                               <a:latin typeface="Cambria Math" panose="02040503050406030204" pitchFamily="18" charset="0"/>
                             </a:rPr>
-                            <m:t>𝑉</m:t>
+                            <m:t>𝑋</m:t>
                           </m:r>
                         </m:e>
                         <m:sub>
@@ -6671,9 +6671,9 @@
                 <a:avLst/>
               </a:prstGeom>
               <a:blipFill>
-                <a:blip r:embed="rId18"/>
+                <a:blip r:embed="rId19"/>
                 <a:stretch>
-                  <a:fillRect r="-133333"/>
+                  <a:fillRect r="-150000"/>
                 </a:stretch>
               </a:blipFill>
             </p:spPr>
@@ -6773,7 +6773,7 @@
                 <a:avLst/>
               </a:prstGeom>
               <a:blipFill>
-                <a:blip r:embed="rId20"/>
+                <a:blip r:embed="rId24"/>
                 <a:stretch>
                   <a:fillRect r="-91304"/>
                 </a:stretch>
@@ -6837,7 +6837,7 @@
                             <a:rPr lang="en-AU" sz="1400" b="0" i="1" smtClean="0">
                               <a:latin typeface="Cambria Math" panose="02040503050406030204" pitchFamily="18" charset="0"/>
                             </a:rPr>
-                            <m:t>𝑉</m:t>
+                            <m:t>𝑋</m:t>
                           </m:r>
                         </m:e>
                         <m:sub>
@@ -6875,9 +6875,9 @@
                 <a:avLst/>
               </a:prstGeom>
               <a:blipFill>
-                <a:blip r:embed="rId21"/>
+                <a:blip r:embed="rId23"/>
                 <a:stretch>
-                  <a:fillRect r="-86957"/>
+                  <a:fillRect r="-108696"/>
                 </a:stretch>
               </a:blipFill>
             </p:spPr>
@@ -6939,7 +6939,7 @@
                             <a:rPr lang="en-AU" sz="1400" b="0" i="1" smtClean="0">
                               <a:latin typeface="Cambria Math" panose="02040503050406030204" pitchFamily="18" charset="0"/>
                             </a:rPr>
-                            <m:t>𝑉</m:t>
+                            <m:t>𝑋</m:t>
                           </m:r>
                         </m:e>
                         <m:sub>
@@ -6977,9 +6977,9 @@
                 <a:avLst/>
               </a:prstGeom>
               <a:blipFill>
-                <a:blip r:embed="rId23"/>
+                <a:blip r:embed="rId25"/>
                 <a:stretch>
-                  <a:fillRect r="-95652"/>
+                  <a:fillRect r="-113043"/>
                 </a:stretch>
               </a:blipFill>
             </p:spPr>
@@ -7041,7 +7041,7 @@
                             <a:rPr lang="en-AU" sz="1400" b="0" i="1" smtClean="0">
                               <a:latin typeface="Cambria Math" panose="02040503050406030204" pitchFamily="18" charset="0"/>
                             </a:rPr>
-                            <m:t>𝑉</m:t>
+                            <m:t>𝑋</m:t>
                           </m:r>
                         </m:e>
                         <m:sub>
@@ -7079,9 +7079,9 @@
                 <a:avLst/>
               </a:prstGeom>
               <a:blipFill>
-                <a:blip r:embed="rId24"/>
+                <a:blip r:embed="rId26"/>
                 <a:stretch>
-                  <a:fillRect r="-143478"/>
+                  <a:fillRect r="-160870"/>
                 </a:stretch>
               </a:blipFill>
             </p:spPr>
@@ -7178,7 +7178,7 @@
                 <a:avLst/>
               </a:prstGeom>
               <a:blipFill>
-                <a:blip r:embed="rId25"/>
+                <a:blip r:embed="rId27"/>
                 <a:stretch>
                   <a:fillRect/>
                 </a:stretch>
@@ -7277,7 +7277,7 @@
                 <a:avLst/>
               </a:prstGeom>
               <a:blipFill>
-                <a:blip r:embed="rId26"/>
+                <a:blip r:embed="rId28"/>
                 <a:stretch>
                   <a:fillRect/>
                 </a:stretch>
@@ -7376,7 +7376,7 @@
                 <a:avLst/>
               </a:prstGeom>
               <a:blipFill>
-                <a:blip r:embed="rId27"/>
+                <a:blip r:embed="rId29"/>
                 <a:stretch>
                   <a:fillRect/>
                 </a:stretch>
@@ -7800,7 +7800,7 @@
                 <a:avLst/>
               </a:prstGeom>
               <a:blipFill>
-                <a:blip r:embed="rId28"/>
+                <a:blip r:embed="rId30"/>
                 <a:stretch>
                   <a:fillRect/>
                 </a:stretch>
@@ -7948,7 +7948,7 @@
                 <a:avLst/>
               </a:prstGeom>
               <a:blipFill>
-                <a:blip r:embed="rId29"/>
+                <a:blip r:embed="rId31"/>
                 <a:stretch>
                   <a:fillRect b="-9756"/>
                 </a:stretch>
@@ -8119,7 +8119,7 @@
                 <a:avLst/>
               </a:prstGeom>
               <a:blipFill>
-                <a:blip r:embed="rId30"/>
+                <a:blip r:embed="rId32"/>
                 <a:stretch>
                   <a:fillRect b="-13115"/>
                 </a:stretch>
@@ -8254,7 +8254,7 @@
                 <a:avLst/>
               </a:prstGeom>
               <a:blipFill>
-                <a:blip r:embed="rId31"/>
+                <a:blip r:embed="rId33"/>
                 <a:stretch>
                   <a:fillRect b="-13115"/>
                 </a:stretch>
@@ -8396,7 +8396,7 @@
                 <a:avLst/>
               </a:prstGeom>
               <a:blipFill>
-                <a:blip r:embed="rId32"/>
+                <a:blip r:embed="rId34"/>
                 <a:stretch>
                   <a:fillRect l="-662" b="-18750"/>
                 </a:stretch>
@@ -8616,7 +8616,7 @@
                             <a:rPr lang="en-AU" sz="1400" b="0" i="1" smtClean="0">
                               <a:latin typeface="Cambria Math" panose="02040503050406030204" pitchFamily="18" charset="0"/>
                             </a:rPr>
-                            <m:t>𝑉</m:t>
+                            <m:t>𝑋</m:t>
                           </m:r>
                         </m:e>
                         <m:sub>
@@ -8654,9 +8654,9 @@
                 <a:avLst/>
               </a:prstGeom>
               <a:blipFill>
-                <a:blip r:embed="rId19"/>
+                <a:blip r:embed="rId20"/>
                 <a:stretch>
-                  <a:fillRect r="-95652"/>
+                  <a:fillRect r="-113043"/>
                 </a:stretch>
               </a:blipFill>
             </p:spPr>
@@ -8756,7 +8756,7 @@
                 <a:avLst/>
               </a:prstGeom>
               <a:blipFill>
-                <a:blip r:embed="rId33"/>
+                <a:blip r:embed="rId35"/>
                 <a:stretch>
                   <a:fillRect r="-95652"/>
                 </a:stretch>
@@ -8820,7 +8820,7 @@
                             <a:rPr lang="en-AU" sz="1400" b="0" i="1" smtClean="0">
                               <a:latin typeface="Cambria Math" panose="02040503050406030204" pitchFamily="18" charset="0"/>
                             </a:rPr>
-                            <m:t>𝑉</m:t>
+                            <m:t>𝑋</m:t>
                           </m:r>
                         </m:e>
                         <m:sub>
@@ -8858,9 +8858,9 @@
                 <a:avLst/>
               </a:prstGeom>
               <a:blipFill>
-                <a:blip r:embed="rId18"/>
+                <a:blip r:embed="rId19"/>
                 <a:stretch>
-                  <a:fillRect r="-143478"/>
+                  <a:fillRect r="-160870"/>
                 </a:stretch>
               </a:blipFill>
             </p:spPr>
@@ -8922,7 +8922,7 @@
                             <a:rPr lang="en-AU" sz="1400" b="0" i="1" smtClean="0">
                               <a:latin typeface="Cambria Math" panose="02040503050406030204" pitchFamily="18" charset="0"/>
                             </a:rPr>
-                            <m:t>𝑉</m:t>
+                            <m:t>𝑋</m:t>
                           </m:r>
                         </m:e>
                         <m:sub>
@@ -8960,9 +8960,9 @@
                 <a:avLst/>
               </a:prstGeom>
               <a:blipFill>
-                <a:blip r:embed="rId34"/>
+                <a:blip r:embed="rId36"/>
                 <a:stretch>
-                  <a:fillRect r="-86957"/>
+                  <a:fillRect r="-108696"/>
                 </a:stretch>
               </a:blipFill>
             </p:spPr>
@@ -9104,7 +9104,7 @@
                 <a:avLst/>
               </a:prstGeom>
               <a:blipFill>
-                <a:blip r:embed="rId35"/>
+                <a:blip r:embed="rId37"/>
                 <a:stretch>
                   <a:fillRect r="-8929"/>
                 </a:stretch>

</xml_diff>